<commit_message>
Anpassung der Schritte beim Installieren des Wörterbuchs.
Anpassung Screenshot Folie 29
</commit_message>
<xml_diff>
--- a/Dart.pptx
+++ b/Dart.pptx
@@ -530,7 +530,7 @@
                   <a:schemeClr val="tx2"/>
                 </a:solidFill>
               </a:rPr>
-              <a:t>05.10.2022</a:t>
+              <a:t>01.03.2023</a:t>
             </a:fld>
             <a:endParaRPr lang="de-DE">
               <a:solidFill>
@@ -880,7 +880,7 @@
             <a:fld id="{B4113CCE-1A1A-46DB-884A-AE560F65C3AF}" type="datetimeFigureOut">
               <a:rPr lang="de-DE" smtClean="0"/>
               <a:pPr/>
-              <a:t>05.10.2022</a:t>
+              <a:t>01.03.2023</a:t>
             </a:fld>
             <a:endParaRPr lang="de-DE"/>
           </a:p>
@@ -9357,7 +9357,7 @@
           <a:p>
             <a:fld id="{4E6DF7AA-8899-480A-AE8B-97B651237939}" type="datetime1">
               <a:rPr lang="de-DE" smtClean="0"/>
-              <a:t>05.10.2022</a:t>
+              <a:t>01.03.2023</a:t>
             </a:fld>
             <a:endParaRPr lang="de-DE"/>
           </a:p>
@@ -9562,7 +9562,7 @@
           <a:p>
             <a:fld id="{A1082C62-1968-4D03-BE49-CB116A4D6814}" type="datetime1">
               <a:rPr lang="de-DE" smtClean="0"/>
-              <a:t>05.10.2022</a:t>
+              <a:t>01.03.2023</a:t>
             </a:fld>
             <a:endParaRPr lang="de-DE"/>
           </a:p>
@@ -9716,7 +9716,7 @@
           <a:p>
             <a:fld id="{C0E04462-FF80-4281-98D0-2AB88E65DA84}" type="datetime1">
               <a:rPr lang="de-DE" smtClean="0"/>
-              <a:t>05.10.2022</a:t>
+              <a:t>01.03.2023</a:t>
             </a:fld>
             <a:endParaRPr lang="de-DE"/>
           </a:p>
@@ -9953,7 +9953,7 @@
           <a:p>
             <a:fld id="{1FAA5A7F-2A4E-40D6-9FFE-960B13817A2C}" type="datetime1">
               <a:rPr lang="de-DE" smtClean="0"/>
-              <a:t>05.10.2022</a:t>
+              <a:t>01.03.2023</a:t>
             </a:fld>
             <a:endParaRPr lang="de-DE"/>
           </a:p>
@@ -10129,7 +10129,7 @@
           <a:p>
             <a:fld id="{382DDC3E-10C9-4B92-B2FB-A8167FB6AB1D}" type="datetime1">
               <a:rPr lang="de-DE" smtClean="0"/>
-              <a:t>05.10.2022</a:t>
+              <a:t>01.03.2023</a:t>
             </a:fld>
             <a:endParaRPr lang="de-DE"/>
           </a:p>
@@ -10305,7 +10305,7 @@
           <a:p>
             <a:fld id="{8159FE7A-07D2-4D3F-9855-29B7F3DF1D43}" type="datetime1">
               <a:rPr lang="de-DE" smtClean="0"/>
-              <a:t>05.10.2022</a:t>
+              <a:t>01.03.2023</a:t>
             </a:fld>
             <a:endParaRPr lang="de-DE"/>
           </a:p>
@@ -10455,7 +10455,7 @@
           <a:p>
             <a:fld id="{7CF1A54B-9CB9-49D3-BA48-5A7ECDBA0943}" type="datetime1">
               <a:rPr lang="de-DE" smtClean="0"/>
-              <a:t>05.10.2022</a:t>
+              <a:t>01.03.2023</a:t>
             </a:fld>
             <a:endParaRPr lang="de-DE"/>
           </a:p>
@@ -10553,7 +10553,7 @@
           <a:p>
             <a:fld id="{5621DBFA-780B-465A-97B9-CC4792E01430}" type="datetime1">
               <a:rPr lang="de-DE" smtClean="0"/>
-              <a:t>05.10.2022</a:t>
+              <a:t>01.03.2023</a:t>
             </a:fld>
             <a:endParaRPr lang="de-DE"/>
           </a:p>
@@ -10677,7 +10677,7 @@
           <a:p>
             <a:fld id="{13ADA68E-BD65-4999-8C0B-CC0F110C2BD3}" type="datetime1">
               <a:rPr lang="de-DE" smtClean="0"/>
-              <a:t>05.10.2022</a:t>
+              <a:t>01.03.2023</a:t>
             </a:fld>
             <a:endParaRPr lang="de-DE"/>
           </a:p>
@@ -10861,7 +10861,7 @@
           <a:p>
             <a:fld id="{93B55C80-8AAA-4242-8442-4A53184707C3}" type="datetime1">
               <a:rPr lang="de-DE" smtClean="0"/>
-              <a:t>05.10.2022</a:t>
+              <a:t>01.03.2023</a:t>
             </a:fld>
             <a:endParaRPr lang="de-DE"/>
           </a:p>
@@ -11066,7 +11066,7 @@
           <a:p>
             <a:fld id="{4485BB24-7FA9-422A-BF70-F9FA49C1D9F8}" type="datetime1">
               <a:rPr lang="de-DE" smtClean="0"/>
-              <a:t>05.10.2022</a:t>
+              <a:t>01.03.2023</a:t>
             </a:fld>
             <a:endParaRPr lang="de-DE"/>
           </a:p>
@@ -11424,7 +11424,7 @@
           <a:p>
             <a:fld id="{3CD93E9C-CF59-4162-A977-F7642EDBB23A}" type="datetime1">
               <a:rPr lang="de-DE" smtClean="0"/>
-              <a:t>05.10.2022</a:t>
+              <a:t>01.03.2023</a:t>
             </a:fld>
             <a:endParaRPr lang="de-DE" dirty="0"/>
           </a:p>
@@ -12065,7 +12065,7 @@
           <a:p>
             <a:fld id="{6FE8A2CE-6D32-4716-A090-EDD7EE0B4140}" type="datetime1">
               <a:rPr lang="de-DE" smtClean="0"/>
-              <a:t>05.10.2022</a:t>
+              <a:t>01.03.2023</a:t>
             </a:fld>
             <a:endParaRPr lang="de-DE" dirty="0"/>
           </a:p>
@@ -12737,7 +12737,7 @@
           <a:p>
             <a:fld id="{603113A9-B1ED-4EC0-A094-9858FCF2D0C8}" type="datetime1">
               <a:rPr lang="de-DE" smtClean="0"/>
-              <a:t>05.10.2022</a:t>
+              <a:t>01.03.2023</a:t>
             </a:fld>
             <a:endParaRPr lang="de-DE"/>
           </a:p>
@@ -12899,7 +12899,7 @@
           <a:p>
             <a:fld id="{D4664C08-255D-43EF-A97B-FABF96999946}" type="datetime1">
               <a:rPr lang="de-DE" smtClean="0"/>
-              <a:t>05.10.2022</a:t>
+              <a:t>01.03.2023</a:t>
             </a:fld>
             <a:endParaRPr lang="de-DE"/>
           </a:p>
@@ -13206,7 +13206,7 @@
           <a:p>
             <a:fld id="{3F431DAA-9B38-40B6-A989-743F7941179E}" type="datetime1">
               <a:rPr lang="de-DE" smtClean="0"/>
-              <a:t>05.10.2022</a:t>
+              <a:t>01.03.2023</a:t>
             </a:fld>
             <a:endParaRPr lang="de-DE"/>
           </a:p>
@@ -13353,6 +13353,33 @@
               <a:t> </a:t>
             </a:r>
           </a:p>
+          <a:p>
+            <a:endParaRPr lang="de-DE" dirty="0"/>
+          </a:p>
+          <a:p>
+            <a:endParaRPr lang="de-DE" dirty="0"/>
+          </a:p>
+          <a:p>
+            <a:endParaRPr lang="de-DE" dirty="0"/>
+          </a:p>
+          <a:p>
+            <a:r>
+              <a:rPr lang="de-DE" dirty="0"/>
+              <a:t>Zip-Datei entpacken</a:t>
+            </a:r>
+          </a:p>
+          <a:p>
+            <a:r>
+              <a:rPr lang="de-DE" dirty="0">
+                <a:latin typeface="Consolas" panose="020B0609020204030204" pitchFamily="49" charset="0"/>
+              </a:rPr>
+              <a:t>de_neu.dic</a:t>
+            </a:r>
+            <a:r>
+              <a:rPr lang="de-DE" dirty="0"/>
+              <a:t> nach X:\flutter verschieben</a:t>
+            </a:r>
+          </a:p>
         </p:txBody>
       </p:sp>
       <p:sp>
@@ -13378,7 +13405,7 @@
           <a:p>
             <a:fld id="{90FC750D-92E1-43D8-A4A2-8761C4AC9C9C}" type="datetime1">
               <a:rPr lang="de-DE" smtClean="0"/>
-              <a:t>05.10.2022</a:t>
+              <a:t>01.03.2023</a:t>
             </a:fld>
             <a:endParaRPr lang="de-DE"/>
           </a:p>
@@ -13609,7 +13636,7 @@
           <a:p>
             <a:fld id="{67B86D56-690E-44D4-B025-B41069787D15}" type="datetime1">
               <a:rPr lang="de-DE" smtClean="0"/>
-              <a:t>05.10.2022</a:t>
+              <a:t>01.03.2023</a:t>
             </a:fld>
             <a:endParaRPr lang="de-DE"/>
           </a:p>
@@ -13674,10 +13701,10 @@
       </p:sp>
       <p:pic>
         <p:nvPicPr>
-          <p:cNvPr id="10" name="Grafik 9">
-            <a:extLst>
-              <a:ext uri="{FF2B5EF4-FFF2-40B4-BE49-F238E27FC236}">
-                <a16:creationId xmlns:a16="http://schemas.microsoft.com/office/drawing/2014/main" id="{C4E74ACF-7DE2-4CFE-A566-18E491AD615E}"/>
+          <p:cNvPr id="12" name="Picture 11">
+            <a:extLst>
+              <a:ext uri="{FF2B5EF4-FFF2-40B4-BE49-F238E27FC236}">
+                <a16:creationId xmlns:a16="http://schemas.microsoft.com/office/drawing/2014/main" id="{DA126E7B-1956-52E4-88C9-A89FCE71B43D}"/>
               </a:ext>
             </a:extLst>
           </p:cNvPr>
@@ -13694,8 +13721,8 @@
         </p:blipFill>
         <p:spPr>
           <a:xfrm>
-            <a:off x="1180446" y="3123383"/>
-            <a:ext cx="5884031" cy="2953975"/>
+            <a:off x="1180447" y="3121425"/>
+            <a:ext cx="4788940" cy="2953975"/>
           </a:xfrm>
           <a:prstGeom prst="rect">
             <a:avLst/>
@@ -13716,7 +13743,7 @@
         </p:nvSpPr>
         <p:spPr>
           <a:xfrm>
-            <a:off x="2608397" y="4365471"/>
+            <a:off x="2739028" y="4049788"/>
             <a:ext cx="274913" cy="249647"/>
           </a:xfrm>
           <a:prstGeom prst="rect">
@@ -13863,7 +13890,7 @@
           <a:p>
             <a:fld id="{252C698B-F0B1-44D7-8F7D-9D6299D534F0}" type="datetime1">
               <a:rPr lang="de-DE" smtClean="0"/>
-              <a:t>05.10.2022</a:t>
+              <a:t>01.03.2023</a:t>
             </a:fld>
             <a:endParaRPr lang="de-DE"/>
           </a:p>
@@ -14366,7 +14393,7 @@
           <a:p>
             <a:fld id="{A952138C-0142-4C6B-A620-863AA96BBBE1}" type="datetime1">
               <a:rPr lang="de-DE" smtClean="0"/>
-              <a:t>05.10.2022</a:t>
+              <a:t>01.03.2023</a:t>
             </a:fld>
             <a:endParaRPr lang="de-DE"/>
           </a:p>
@@ -14602,7 +14629,7 @@
           <a:p>
             <a:fld id="{7127E464-1A99-4532-A297-E1D7378D9E61}" type="datetime1">
               <a:rPr lang="de-DE" smtClean="0"/>
-              <a:t>05.10.2022</a:t>
+              <a:t>01.03.2023</a:t>
             </a:fld>
             <a:endParaRPr lang="de-DE"/>
           </a:p>
@@ -14983,7 +15010,7 @@
           <a:p>
             <a:fld id="{77B5C711-A7A8-40A0-AEA6-3F77D4628817}" type="datetime1">
               <a:rPr lang="de-DE" smtClean="0"/>
-              <a:t>05.10.2022</a:t>
+              <a:t>01.03.2023</a:t>
             </a:fld>
             <a:endParaRPr lang="de-DE"/>
           </a:p>
@@ -15362,7 +15389,7 @@
           <a:p>
             <a:fld id="{27A2010A-1149-4F23-80A2-1B4570F18F3A}" type="datetime1">
               <a:rPr lang="de-DE" smtClean="0"/>
-              <a:t>05.10.2022</a:t>
+              <a:t>01.03.2023</a:t>
             </a:fld>
             <a:endParaRPr lang="de-DE"/>
           </a:p>
@@ -15619,7 +15646,7 @@
           <a:p>
             <a:fld id="{B70EBCA3-FB0B-48D9-A2E5-56DBD5624AFE}" type="datetime1">
               <a:rPr lang="de-DE" smtClean="0"/>
-              <a:t>05.10.2022</a:t>
+              <a:t>01.03.2023</a:t>
             </a:fld>
             <a:endParaRPr lang="de-DE"/>
           </a:p>
@@ -15933,7 +15960,7 @@
           <a:p>
             <a:fld id="{AAEBEB04-CBF0-4835-872C-2565D4E2EBF1}" type="datetime1">
               <a:rPr lang="de-DE" smtClean="0"/>
-              <a:t>05.10.2022</a:t>
+              <a:t>01.03.2023</a:t>
             </a:fld>
             <a:endParaRPr lang="de-DE"/>
           </a:p>
@@ -16236,7 +16263,7 @@
           <a:p>
             <a:fld id="{92A047F3-1820-4570-AC17-C8DA167C5F14}" type="datetime1">
               <a:rPr lang="de-DE" smtClean="0"/>
-              <a:t>05.10.2022</a:t>
+              <a:t>01.03.2023</a:t>
             </a:fld>
             <a:endParaRPr lang="de-DE"/>
           </a:p>
@@ -16705,7 +16732,7 @@
           <a:p>
             <a:fld id="{8F663D0B-A90A-4472-ADF1-2D4D5E0E002A}" type="datetime1">
               <a:rPr lang="de-DE" smtClean="0"/>
-              <a:t>05.10.2022</a:t>
+              <a:t>01.03.2023</a:t>
             </a:fld>
             <a:endParaRPr lang="de-DE"/>
           </a:p>
@@ -16895,7 +16922,7 @@
           <a:p>
             <a:fld id="{59577B53-2C7E-4EC5-B9C8-6C04D3456AA1}" type="datetime1">
               <a:rPr lang="de-DE" smtClean="0"/>
-              <a:t>05.10.2022</a:t>
+              <a:t>01.03.2023</a:t>
             </a:fld>
             <a:endParaRPr lang="de-DE"/>
           </a:p>
@@ -17457,7 +17484,7 @@
           <a:p>
             <a:fld id="{C3460205-A5AE-420E-9AB9-04AA7C4205FA}" type="datetime1">
               <a:rPr lang="de-DE" smtClean="0"/>
-              <a:t>05.10.2022</a:t>
+              <a:t>01.03.2023</a:t>
             </a:fld>
             <a:endParaRPr lang="de-DE"/>
           </a:p>
@@ -17954,7 +17981,7 @@
           <a:p>
             <a:fld id="{C81998FD-B568-4E47-AA9F-CE36B3FEB5BA}" type="datetime1">
               <a:rPr lang="de-DE" smtClean="0"/>
-              <a:t>05.10.2022</a:t>
+              <a:t>01.03.2023</a:t>
             </a:fld>
             <a:endParaRPr lang="de-DE"/>
           </a:p>
@@ -18310,7 +18337,7 @@
           <a:p>
             <a:fld id="{0A4F56F1-7827-4042-A276-DAF40AC0B000}" type="datetime1">
               <a:rPr lang="de-DE" smtClean="0"/>
-              <a:t>05.10.2022</a:t>
+              <a:t>01.03.2023</a:t>
             </a:fld>
             <a:endParaRPr lang="de-DE"/>
           </a:p>
@@ -18608,7 +18635,7 @@
           <a:p>
             <a:fld id="{DAB02174-66FA-41E9-A997-DF7D3619438B}" type="datetime1">
               <a:rPr lang="de-DE" smtClean="0"/>
-              <a:t>05.10.2022</a:t>
+              <a:t>01.03.2023</a:t>
             </a:fld>
             <a:endParaRPr lang="de-DE"/>
           </a:p>
@@ -18989,7 +19016,7 @@
           <a:p>
             <a:fld id="{BDFFDF87-2C7B-4FBB-B7F3-0EB8FC88FA6F}" type="datetime1">
               <a:rPr lang="de-DE" smtClean="0"/>
-              <a:t>05.10.2022</a:t>
+              <a:t>01.03.2023</a:t>
             </a:fld>
             <a:endParaRPr lang="de-DE"/>
           </a:p>
@@ -19322,7 +19349,7 @@
           <a:p>
             <a:fld id="{4AEAFF43-79D1-488F-88E5-AECF0C52E4F6}" type="datetime1">
               <a:rPr lang="de-DE" smtClean="0"/>
-              <a:t>05.10.2022</a:t>
+              <a:t>01.03.2023</a:t>
             </a:fld>
             <a:endParaRPr lang="de-DE"/>
           </a:p>
@@ -19600,7 +19627,7 @@
           <a:p>
             <a:fld id="{F3624D99-4580-4939-A184-6854C4D65CB3}" type="datetime1">
               <a:rPr lang="de-DE" smtClean="0"/>
-              <a:t>05.10.2022</a:t>
+              <a:t>01.03.2023</a:t>
             </a:fld>
             <a:endParaRPr lang="de-DE"/>
           </a:p>
@@ -19796,7 +19823,7 @@
           <a:p>
             <a:fld id="{642CBE49-AABD-4678-8D76-A8610D6E4D30}" type="datetime1">
               <a:rPr lang="de-DE" smtClean="0"/>
-              <a:t>05.10.2022</a:t>
+              <a:t>01.03.2023</a:t>
             </a:fld>
             <a:endParaRPr lang="de-DE"/>
           </a:p>
@@ -19861,10 +19888,10 @@
       </p:sp>
       <p:pic>
         <p:nvPicPr>
-          <p:cNvPr id="11" name="Grafik 10">
-            <a:extLst>
-              <a:ext uri="{FF2B5EF4-FFF2-40B4-BE49-F238E27FC236}">
-                <a16:creationId xmlns:a16="http://schemas.microsoft.com/office/drawing/2014/main" id="{EB9227D5-8D8E-4007-9206-E9F3D1D37801}"/>
+          <p:cNvPr id="8" name="Picture 7">
+            <a:extLst>
+              <a:ext uri="{FF2B5EF4-FFF2-40B4-BE49-F238E27FC236}">
+                <a16:creationId xmlns:a16="http://schemas.microsoft.com/office/drawing/2014/main" id="{BF6CB45E-1DD9-0C1A-9CEA-2F97DC49A048}"/>
               </a:ext>
             </a:extLst>
           </p:cNvPr>
@@ -19882,7 +19909,7 @@
         <p:spPr>
           <a:xfrm>
             <a:off x="4937898" y="2122539"/>
-            <a:ext cx="6687483" cy="3705742"/>
+            <a:ext cx="6687483" cy="3523578"/>
           </a:xfrm>
           <a:prstGeom prst="rect">
             <a:avLst/>
@@ -20063,7 +20090,7 @@
           <a:p>
             <a:fld id="{2E581C20-4FEA-4BDB-99ED-7F7C03D2ECE0}" type="datetime1">
               <a:rPr lang="de-DE" smtClean="0"/>
-              <a:t>05.10.2022</a:t>
+              <a:t>01.03.2023</a:t>
             </a:fld>
             <a:endParaRPr lang="de-DE"/>
           </a:p>
@@ -20497,7 +20524,7 @@
           <a:p>
             <a:fld id="{9C5032AF-412C-4954-8799-22E9C987B64F}" type="datetime1">
               <a:rPr lang="de-DE" smtClean="0"/>
-              <a:t>05.10.2022</a:t>
+              <a:t>01.03.2023</a:t>
             </a:fld>
             <a:endParaRPr lang="de-DE"/>
           </a:p>
@@ -21075,7 +21102,7 @@
           <a:p>
             <a:fld id="{F2FEDD9D-5594-473A-899D-C0AD9514F726}" type="datetime1">
               <a:rPr lang="de-DE" smtClean="0"/>
-              <a:t>05.10.2022</a:t>
+              <a:t>01.03.2023</a:t>
             </a:fld>
             <a:endParaRPr lang="de-DE"/>
           </a:p>
@@ -21337,7 +21364,7 @@
           <a:p>
             <a:fld id="{95C3B550-B314-4EBE-B643-25AC9427FA8B}" type="datetime1">
               <a:rPr lang="de-DE" smtClean="0"/>
-              <a:t>05.10.2022</a:t>
+              <a:t>01.03.2023</a:t>
             </a:fld>
             <a:endParaRPr lang="de-DE"/>
           </a:p>
@@ -21683,7 +21710,7 @@
           <a:p>
             <a:fld id="{767B626B-00B4-4CEC-8206-7F4851B03FEF}" type="datetime1">
               <a:rPr lang="de-DE" smtClean="0"/>
-              <a:t>05.10.2022</a:t>
+              <a:t>01.03.2023</a:t>
             </a:fld>
             <a:endParaRPr lang="de-DE"/>
           </a:p>
@@ -21995,7 +22022,7 @@
           <a:p>
             <a:fld id="{102EEC64-5E38-4CDE-986C-4F454B58738A}" type="datetime1">
               <a:rPr lang="de-DE" smtClean="0"/>
-              <a:t>05.10.2022</a:t>
+              <a:t>01.03.2023</a:t>
             </a:fld>
             <a:endParaRPr lang="de-DE"/>
           </a:p>
@@ -22228,7 +22255,7 @@
           <a:p>
             <a:fld id="{8B9E1184-3E8E-4927-B70E-FCD133F545CF}" type="datetime1">
               <a:rPr lang="de-DE" smtClean="0"/>
-              <a:t>05.10.2022</a:t>
+              <a:t>01.03.2023</a:t>
             </a:fld>
             <a:endParaRPr lang="de-DE"/>
           </a:p>
@@ -22656,7 +22683,7 @@
           <a:p>
             <a:fld id="{372285A9-CAD1-4F8C-A320-59D4C92876C5}" type="datetime1">
               <a:rPr lang="de-DE" smtClean="0"/>
-              <a:t>05.10.2022</a:t>
+              <a:t>01.03.2023</a:t>
             </a:fld>
             <a:endParaRPr lang="de-DE"/>
           </a:p>
@@ -22869,7 +22896,7 @@
           <a:p>
             <a:fld id="{2F8DC1E6-2D30-4DE7-9C9D-5217FE18022E}" type="datetime1">
               <a:rPr lang="de-DE" smtClean="0"/>
-              <a:t>05.10.2022</a:t>
+              <a:t>01.03.2023</a:t>
             </a:fld>
             <a:endParaRPr lang="de-DE"/>
           </a:p>
@@ -23013,7 +23040,7 @@
           <a:p>
             <a:fld id="{893F816E-7DC2-4064-87AA-D097DF435DB9}" type="datetime1">
               <a:rPr lang="de-DE" smtClean="0"/>
-              <a:t>05.10.2022</a:t>
+              <a:t>01.03.2023</a:t>
             </a:fld>
             <a:endParaRPr lang="de-DE"/>
           </a:p>
@@ -23250,7 +23277,7 @@
           <a:p>
             <a:fld id="{637BE197-E414-48F3-B656-784E07538695}" type="datetime1">
               <a:rPr lang="de-DE" smtClean="0"/>
-              <a:t>05.10.2022</a:t>
+              <a:t>01.03.2023</a:t>
             </a:fld>
             <a:endParaRPr lang="de-DE"/>
           </a:p>
@@ -23546,7 +23573,7 @@
           <a:p>
             <a:fld id="{AC9925A1-4637-41D7-AEAC-8AA9FDFB7140}" type="datetime1">
               <a:rPr lang="de-DE" smtClean="0"/>
-              <a:t>05.10.2022</a:t>
+              <a:t>01.03.2023</a:t>
             </a:fld>
             <a:endParaRPr lang="de-DE"/>
           </a:p>
@@ -24129,7 +24156,7 @@
           <a:p>
             <a:fld id="{BC048919-3C08-48F6-A0CD-915EC777362A}" type="datetime1">
               <a:rPr lang="de-DE" smtClean="0"/>
-              <a:t>05.10.2022</a:t>
+              <a:t>01.03.2023</a:t>
             </a:fld>
             <a:endParaRPr lang="de-DE"/>
           </a:p>
@@ -24382,7 +24409,7 @@
           <a:p>
             <a:fld id="{94C91350-6869-4C72-8675-ECEAAAF05F8D}" type="datetime1">
               <a:rPr lang="de-DE" smtClean="0"/>
-              <a:t>05.10.2022</a:t>
+              <a:t>01.03.2023</a:t>
             </a:fld>
             <a:endParaRPr lang="de-DE"/>
           </a:p>
@@ -24724,7 +24751,7 @@
           <a:p>
             <a:fld id="{ACA1733B-6687-4EEA-9A6B-2EF228C82457}" type="datetime1">
               <a:rPr lang="de-DE" smtClean="0"/>
-              <a:t>05.10.2022</a:t>
+              <a:t>01.03.2023</a:t>
             </a:fld>
             <a:endParaRPr lang="de-DE"/>
           </a:p>
@@ -25057,7 +25084,7 @@
           <a:p>
             <a:fld id="{2BBD85E3-27A5-4125-9DB2-C537C85BBE8A}" type="datetime1">
               <a:rPr lang="de-DE" smtClean="0"/>
-              <a:t>05.10.2022</a:t>
+              <a:t>01.03.2023</a:t>
             </a:fld>
             <a:endParaRPr lang="de-DE"/>
           </a:p>
@@ -25232,7 +25259,7 @@
           <a:p>
             <a:fld id="{115AC75E-72B2-486D-BEF5-A13F9B218F2F}" type="datetime1">
               <a:rPr lang="de-DE" smtClean="0"/>
-              <a:t>05.10.2022</a:t>
+              <a:t>01.03.2023</a:t>
             </a:fld>
             <a:endParaRPr lang="de-DE"/>
           </a:p>
@@ -25632,7 +25659,7 @@
           <a:p>
             <a:fld id="{B8ECF4B1-F230-4767-9D40-08A350DFB7D7}" type="datetime1">
               <a:rPr lang="de-DE" smtClean="0"/>
-              <a:t>05.10.2022</a:t>
+              <a:t>01.03.2023</a:t>
             </a:fld>
             <a:endParaRPr lang="de-DE"/>
           </a:p>
@@ -25968,7 +25995,7 @@
           <a:p>
             <a:fld id="{DFEB386C-A89C-4E71-8C7A-EB57A1CCB74F}" type="datetime1">
               <a:rPr lang="de-DE" smtClean="0"/>
-              <a:t>05.10.2022</a:t>
+              <a:t>01.03.2023</a:t>
             </a:fld>
             <a:endParaRPr lang="de-DE"/>
           </a:p>
@@ -26313,7 +26340,7 @@
           <a:p>
             <a:fld id="{E3A6C6BD-3868-452A-A2BD-92328FD8B4E8}" type="datetime1">
               <a:rPr lang="de-DE" smtClean="0"/>
-              <a:t>05.10.2022</a:t>
+              <a:t>01.03.2023</a:t>
             </a:fld>
             <a:endParaRPr lang="de-DE"/>
           </a:p>
@@ -26532,7 +26559,7 @@
           <a:p>
             <a:fld id="{B60FD287-29C3-4567-A3C8-1214880B52D5}" type="datetime1">
               <a:rPr lang="de-DE" smtClean="0"/>
-              <a:t>05.10.2022</a:t>
+              <a:t>01.03.2023</a:t>
             </a:fld>
             <a:endParaRPr lang="de-DE"/>
           </a:p>
@@ -26927,7 +26954,7 @@
           <a:p>
             <a:fld id="{172E1AE1-643D-418C-ACE4-F2637FAE5286}" type="datetime1">
               <a:rPr lang="de-DE" smtClean="0"/>
-              <a:t>05.10.2022</a:t>
+              <a:t>01.03.2023</a:t>
             </a:fld>
             <a:endParaRPr lang="de-DE"/>
           </a:p>
@@ -27240,7 +27267,7 @@
           <a:p>
             <a:fld id="{C74E5831-6EC7-46CD-950B-539BB31CC002}" type="datetime1">
               <a:rPr lang="de-DE" smtClean="0"/>
-              <a:t>05.10.2022</a:t>
+              <a:t>01.03.2023</a:t>
             </a:fld>
             <a:endParaRPr lang="de-DE"/>
           </a:p>
@@ -27869,7 +27896,7 @@
           <a:p>
             <a:fld id="{0C2E1D0D-BBB0-4269-8DC7-C28B8DA8D26F}" type="datetime1">
               <a:rPr lang="de-DE" smtClean="0"/>
-              <a:t>05.10.2022</a:t>
+              <a:t>01.03.2023</a:t>
             </a:fld>
             <a:endParaRPr lang="de-DE"/>
           </a:p>
@@ -28177,7 +28204,7 @@
           <a:p>
             <a:fld id="{509B9FD4-6125-48DF-AAFB-8A90591F704C}" type="datetime1">
               <a:rPr lang="de-DE" smtClean="0"/>
-              <a:t>05.10.2022</a:t>
+              <a:t>01.03.2023</a:t>
             </a:fld>
             <a:endParaRPr lang="de-DE"/>
           </a:p>
@@ -28453,7 +28480,7 @@
           <a:p>
             <a:fld id="{5E005D36-C238-4437-9368-75EE1209248D}" type="datetime1">
               <a:rPr lang="de-DE" smtClean="0"/>
-              <a:t>05.10.2022</a:t>
+              <a:t>01.03.2023</a:t>
             </a:fld>
             <a:endParaRPr lang="de-DE"/>
           </a:p>
@@ -28633,7 +28660,7 @@
           <a:p>
             <a:fld id="{21A4D148-919D-4643-B21F-50F1B7EF8BA2}" type="datetime1">
               <a:rPr lang="de-DE" smtClean="0"/>
-              <a:t>05.10.2022</a:t>
+              <a:t>01.03.2023</a:t>
             </a:fld>
             <a:endParaRPr lang="de-DE"/>
           </a:p>
@@ -29038,7 +29065,7 @@
           <a:p>
             <a:fld id="{A3D84A41-9102-4FAF-BB9B-7AD126A78344}" type="datetime1">
               <a:rPr lang="de-DE" smtClean="0"/>
-              <a:t>05.10.2022</a:t>
+              <a:t>01.03.2023</a:t>
             </a:fld>
             <a:endParaRPr lang="de-DE"/>
           </a:p>
@@ -29648,7 +29675,7 @@
           <a:p>
             <a:fld id="{81CA66B2-419B-4A00-B550-DA1493185108}" type="datetime1">
               <a:rPr lang="de-DE" smtClean="0"/>
-              <a:t>05.10.2022</a:t>
+              <a:t>01.03.2023</a:t>
             </a:fld>
             <a:endParaRPr lang="de-DE"/>
           </a:p>
@@ -30477,7 +30504,7 @@
           <a:p>
             <a:fld id="{374AF400-B2B3-4498-869C-65158B84F62E}" type="datetime1">
               <a:rPr lang="de-DE" smtClean="0"/>
-              <a:t>05.10.2022</a:t>
+              <a:t>01.03.2023</a:t>
             </a:fld>
             <a:endParaRPr lang="de-DE"/>
           </a:p>
@@ -30687,7 +30714,7 @@
           <a:p>
             <a:fld id="{EECFBCB7-6E51-47D1-88C0-70C111ACD504}" type="datetime1">
               <a:rPr lang="de-DE" smtClean="0"/>
-              <a:t>05.10.2022</a:t>
+              <a:t>01.03.2023</a:t>
             </a:fld>
             <a:endParaRPr lang="de-DE"/>
           </a:p>
@@ -31125,7 +31152,7 @@
           <a:p>
             <a:fld id="{284F0D45-833B-4CA2-95DA-AFDB6EDAE49B}" type="datetime1">
               <a:rPr lang="de-DE" smtClean="0"/>
-              <a:t>05.10.2022</a:t>
+              <a:t>01.03.2023</a:t>
             </a:fld>
             <a:endParaRPr lang="de-DE"/>
           </a:p>
@@ -31425,7 +31452,7 @@
           <a:p>
             <a:fld id="{F8D4647A-5A37-41ED-945E-4016D17F713F}" type="datetime1">
               <a:rPr lang="de-DE" smtClean="0"/>
-              <a:t>05.10.2022</a:t>
+              <a:t>01.03.2023</a:t>
             </a:fld>
             <a:endParaRPr lang="de-DE"/>
           </a:p>
@@ -31667,7 +31694,7 @@
           <a:p>
             <a:fld id="{040A1E27-A9C0-4EC9-BE62-C00CB62B7D24}" type="datetime1">
               <a:rPr lang="de-DE" smtClean="0"/>
-              <a:t>05.10.2022</a:t>
+              <a:t>01.03.2023</a:t>
             </a:fld>
             <a:endParaRPr lang="de-DE"/>
           </a:p>
@@ -31878,7 +31905,7 @@
           <a:p>
             <a:fld id="{8159FE7A-07D2-4D3F-9855-29B7F3DF1D43}" type="datetime1">
               <a:rPr lang="de-DE" smtClean="0"/>
-              <a:t>05.10.2022</a:t>
+              <a:t>01.03.2023</a:t>
             </a:fld>
             <a:endParaRPr lang="de-DE"/>
           </a:p>
@@ -32844,7 +32871,7 @@
           <a:p>
             <a:fld id="{8159FE7A-07D2-4D3F-9855-29B7F3DF1D43}" type="datetime1">
               <a:rPr lang="de-DE" smtClean="0"/>
-              <a:t>05.10.2022</a:t>
+              <a:t>01.03.2023</a:t>
             </a:fld>
             <a:endParaRPr lang="de-DE"/>
           </a:p>
@@ -33623,7 +33650,7 @@
           <a:p>
             <a:fld id="{8159FE7A-07D2-4D3F-9855-29B7F3DF1D43}" type="datetime1">
               <a:rPr lang="de-DE" smtClean="0"/>
-              <a:t>05.10.2022</a:t>
+              <a:t>01.03.2023</a:t>
             </a:fld>
             <a:endParaRPr lang="de-DE"/>
           </a:p>
@@ -34373,7 +34400,7 @@
           <a:p>
             <a:fld id="{8159FE7A-07D2-4D3F-9855-29B7F3DF1D43}" type="datetime1">
               <a:rPr lang="de-DE" smtClean="0"/>
-              <a:t>05.10.2022</a:t>
+              <a:t>01.03.2023</a:t>
             </a:fld>
             <a:endParaRPr lang="de-DE"/>
           </a:p>
@@ -34634,7 +34661,7 @@
           <a:p>
             <a:fld id="{BC1A8AC8-5070-4C02-8E82-DE4FD3F8497A}" type="datetime1">
               <a:rPr lang="de-DE" smtClean="0"/>
-              <a:t>05.10.2022</a:t>
+              <a:t>01.03.2023</a:t>
             </a:fld>
             <a:endParaRPr lang="de-DE"/>
           </a:p>
@@ -34947,7 +34974,7 @@
           <a:p>
             <a:fld id="{AF1CB7BF-E60D-47C9-99CD-43B03711F834}" type="datetime1">
               <a:rPr lang="de-DE" smtClean="0"/>
-              <a:t>05.10.2022</a:t>
+              <a:t>01.03.2023</a:t>
             </a:fld>
             <a:endParaRPr lang="de-DE"/>
           </a:p>
@@ -35156,7 +35183,7 @@
           <a:p>
             <a:fld id="{B9053FEB-F038-4EB7-B9DC-77977117EA33}" type="datetime1">
               <a:rPr lang="de-DE" smtClean="0"/>
-              <a:t>05.10.2022</a:t>
+              <a:t>01.03.2023</a:t>
             </a:fld>
             <a:endParaRPr lang="de-DE"/>
           </a:p>
@@ -35716,7 +35743,7 @@
           <a:p>
             <a:fld id="{0B399FA5-2F01-416C-865E-705C1E0C03C8}" type="datetime1">
               <a:rPr lang="de-DE" smtClean="0"/>
-              <a:t>05.10.2022</a:t>
+              <a:t>01.03.2023</a:t>
             </a:fld>
             <a:endParaRPr lang="de-DE"/>
           </a:p>
@@ -36199,7 +36226,7 @@
           <a:p>
             <a:fld id="{D7CFAA5B-8ED2-4D87-B5CD-876772B506EB}" type="datetime1">
               <a:rPr lang="de-DE" smtClean="0"/>
-              <a:t>05.10.2022</a:t>
+              <a:t>01.03.2023</a:t>
             </a:fld>
             <a:endParaRPr lang="de-DE"/>
           </a:p>
@@ -36673,7 +36700,7 @@
           <a:p>
             <a:fld id="{706CFF74-9D82-4823-AFE2-CBE8D2D808FC}" type="datetime1">
               <a:rPr lang="de-DE" smtClean="0"/>
-              <a:t>05.10.2022</a:t>
+              <a:t>01.03.2023</a:t>
             </a:fld>
             <a:endParaRPr lang="de-DE"/>
           </a:p>
@@ -36944,7 +36971,7 @@
           <a:p>
             <a:fld id="{5C03BAA7-20D5-4E1B-8CB5-A2ED8F9EFD7F}" type="datetime1">
               <a:rPr lang="de-DE" smtClean="0"/>
-              <a:t>05.10.2022</a:t>
+              <a:t>01.03.2023</a:t>
             </a:fld>
             <a:endParaRPr lang="de-DE"/>
           </a:p>
@@ -37143,7 +37170,7 @@
           <a:p>
             <a:fld id="{DF7C2B1F-6E2C-496E-BFF9-7CD4B274FE9C}" type="datetime1">
               <a:rPr lang="de-DE" smtClean="0"/>
-              <a:t>05.10.2022</a:t>
+              <a:t>01.03.2023</a:t>
             </a:fld>
             <a:endParaRPr lang="de-DE"/>
           </a:p>
@@ -37383,7 +37410,7 @@
           <a:p>
             <a:fld id="{8159FE7A-07D2-4D3F-9855-29B7F3DF1D43}" type="datetime1">
               <a:rPr lang="de-DE" smtClean="0"/>
-              <a:t>05.10.2022</a:t>
+              <a:t>01.03.2023</a:t>
             </a:fld>
             <a:endParaRPr lang="de-DE"/>
           </a:p>
@@ -37877,7 +37904,7 @@
           <a:p>
             <a:fld id="{8159FE7A-07D2-4D3F-9855-29B7F3DF1D43}" type="datetime1">
               <a:rPr lang="de-DE" smtClean="0"/>
-              <a:t>05.10.2022</a:t>
+              <a:t>01.03.2023</a:t>
             </a:fld>
             <a:endParaRPr lang="de-DE"/>
           </a:p>
@@ -38268,7 +38295,7 @@
           <a:p>
             <a:fld id="{8159FE7A-07D2-4D3F-9855-29B7F3DF1D43}" type="datetime1">
               <a:rPr lang="de-DE" smtClean="0"/>
-              <a:t>05.10.2022</a:t>
+              <a:t>01.03.2023</a:t>
             </a:fld>
             <a:endParaRPr lang="de-DE"/>
           </a:p>
@@ -38686,7 +38713,7 @@
           <a:p>
             <a:fld id="{8159FE7A-07D2-4D3F-9855-29B7F3DF1D43}" type="datetime1">
               <a:rPr lang="de-DE" smtClean="0"/>
-              <a:t>05.10.2022</a:t>
+              <a:t>01.03.2023</a:t>
             </a:fld>
             <a:endParaRPr lang="de-DE"/>
           </a:p>
@@ -39645,7 +39672,7 @@
           <a:p>
             <a:fld id="{8159FE7A-07D2-4D3F-9855-29B7F3DF1D43}" type="datetime1">
               <a:rPr lang="de-DE" smtClean="0"/>
-              <a:t>05.10.2022</a:t>
+              <a:t>01.03.2023</a:t>
             </a:fld>
             <a:endParaRPr lang="de-DE"/>
           </a:p>
@@ -39959,7 +39986,7 @@
           <a:p>
             <a:fld id="{8159FE7A-07D2-4D3F-9855-29B7F3DF1D43}" type="datetime1">
               <a:rPr lang="de-DE" smtClean="0"/>
-              <a:t>05.10.2022</a:t>
+              <a:t>01.03.2023</a:t>
             </a:fld>
             <a:endParaRPr lang="de-DE"/>
           </a:p>
@@ -40278,7 +40305,7 @@
           <a:p>
             <a:fld id="{B1DC90A9-3629-4532-90FF-C4E33F6085C7}" type="datetime1">
               <a:rPr lang="de-DE" smtClean="0"/>
-              <a:t>05.10.2022</a:t>
+              <a:t>01.03.2023</a:t>
             </a:fld>
             <a:endParaRPr lang="de-DE"/>
           </a:p>
@@ -40878,7 +40905,7 @@
           <a:p>
             <a:fld id="{23613DF9-A7E5-45FC-950B-BCC0B949EAE8}" type="datetime1">
               <a:rPr lang="de-DE" smtClean="0"/>
-              <a:t>05.10.2022</a:t>
+              <a:t>01.03.2023</a:t>
             </a:fld>
             <a:endParaRPr lang="de-DE"/>
           </a:p>
@@ -41061,7 +41088,7 @@
           <a:p>
             <a:fld id="{52EDD6C4-E3A8-4042-BB5D-CDA1A571A185}" type="datetime1">
               <a:rPr lang="de-DE" smtClean="0"/>
-              <a:t>05.10.2022</a:t>
+              <a:t>01.03.2023</a:t>
             </a:fld>
             <a:endParaRPr lang="de-DE"/>
           </a:p>
@@ -41602,7 +41629,7 @@
           <a:p>
             <a:fld id="{DDF7F67B-F411-40A4-BFC4-67CF6BB150A8}" type="datetime1">
               <a:rPr lang="de-DE" smtClean="0"/>
-              <a:t>05.10.2022</a:t>
+              <a:t>01.03.2023</a:t>
             </a:fld>
             <a:endParaRPr lang="de-DE"/>
           </a:p>
@@ -41946,7 +41973,7 @@
           <a:p>
             <a:fld id="{0A4B30BD-3EA6-4E11-8FCF-965C309E549A}" type="datetime1">
               <a:rPr lang="de-DE" smtClean="0"/>
-              <a:t>05.10.2022</a:t>
+              <a:t>01.03.2023</a:t>
             </a:fld>
             <a:endParaRPr lang="de-DE"/>
           </a:p>
@@ -42151,7 +42178,7 @@
           <a:p>
             <a:fld id="{DC040C72-25B9-466A-8F50-EBEC34934428}" type="datetime1">
               <a:rPr lang="de-DE" smtClean="0"/>
-              <a:t>05.10.2022</a:t>
+              <a:t>01.03.2023</a:t>
             </a:fld>
             <a:endParaRPr lang="de-DE"/>
           </a:p>
@@ -42632,7 +42659,7 @@
           <a:p>
             <a:fld id="{D285A436-1444-4657-AC1F-E488FE3B222B}" type="datetime1">
               <a:rPr lang="de-DE" smtClean="0"/>
-              <a:t>05.10.2022</a:t>
+              <a:t>01.03.2023</a:t>
             </a:fld>
             <a:endParaRPr lang="de-DE"/>
           </a:p>
@@ -42931,7 +42958,7 @@
           <a:p>
             <a:fld id="{93D272A3-5ACD-4745-88C6-1454260DA419}" type="datetime1">
               <a:rPr lang="de-DE" smtClean="0"/>
-              <a:t>05.10.2022</a:t>
+              <a:t>01.03.2023</a:t>
             </a:fld>
             <a:endParaRPr lang="de-DE"/>
           </a:p>
@@ -44080,7 +44107,7 @@
           <a:p>
             <a:fld id="{40518CB0-8C60-4E9D-9D73-72C22CA560A6}" type="datetime1">
               <a:rPr lang="de-DE" smtClean="0"/>
-              <a:t>05.10.2022</a:t>
+              <a:t>01.03.2023</a:t>
             </a:fld>
             <a:endParaRPr lang="de-DE"/>
           </a:p>
@@ -44403,7 +44430,7 @@
           <a:p>
             <a:fld id="{CC68D73E-E1AC-4A78-BFE5-D11401939CB4}" type="datetime1">
               <a:rPr lang="de-DE" smtClean="0"/>
-              <a:t>05.10.2022</a:t>
+              <a:t>01.03.2023</a:t>
             </a:fld>
             <a:endParaRPr lang="de-DE"/>
           </a:p>
@@ -45485,7 +45512,7 @@
           <a:p>
             <a:fld id="{6F2D9553-3793-4073-884D-343164046EA8}" type="datetime1">
               <a:rPr lang="de-DE" smtClean="0"/>
-              <a:t>05.10.2022</a:t>
+              <a:t>01.03.2023</a:t>
             </a:fld>
             <a:endParaRPr lang="de-DE"/>
           </a:p>
@@ -45960,7 +45987,7 @@
           <a:p>
             <a:fld id="{B5791953-A376-4A7E-8677-AAB812D71689}" type="datetime1">
               <a:rPr lang="de-DE" smtClean="0"/>
-              <a:t>05.10.2022</a:t>
+              <a:t>01.03.2023</a:t>
             </a:fld>
             <a:endParaRPr lang="de-DE"/>
           </a:p>
@@ -46167,7 +46194,7 @@
           <a:p>
             <a:fld id="{5B795128-38A1-4494-B687-FA4BAF969426}" type="datetime1">
               <a:rPr lang="de-DE" smtClean="0"/>
-              <a:t>05.10.2022</a:t>
+              <a:t>01.03.2023</a:t>
             </a:fld>
             <a:endParaRPr lang="de-DE"/>
           </a:p>
@@ -46361,7 +46388,7 @@
           <a:p>
             <a:fld id="{5F4637E3-489C-402C-9745-FC1C6A002798}" type="datetime1">
               <a:rPr lang="de-DE" smtClean="0"/>
-              <a:t>05.10.2022</a:t>
+              <a:t>01.03.2023</a:t>
             </a:fld>
             <a:endParaRPr lang="de-DE"/>
           </a:p>
@@ -46600,7 +46627,7 @@
           <a:p>
             <a:fld id="{96C0D114-F0DB-443F-9337-40D84E177FDC}" type="datetime1">
               <a:rPr lang="de-DE" smtClean="0"/>
-              <a:t>05.10.2022</a:t>
+              <a:t>01.03.2023</a:t>
             </a:fld>
             <a:endParaRPr lang="de-DE"/>
           </a:p>
@@ -46798,7 +46825,7 @@
           <a:p>
             <a:fld id="{DC9D7DCD-D634-4B62-9FA2-4E9A76968B39}" type="datetime1">
               <a:rPr lang="de-DE" smtClean="0"/>
-              <a:t>05.10.2022</a:t>
+              <a:t>01.03.2023</a:t>
             </a:fld>
             <a:endParaRPr lang="de-DE"/>
           </a:p>
@@ -47303,7 +47330,7 @@
           <a:p>
             <a:fld id="{3665ADD3-A45B-4AFB-ADB5-8849ACC19EEF}" type="datetime1">
               <a:rPr lang="de-DE" smtClean="0"/>
-              <a:t>05.10.2022</a:t>
+              <a:t>01.03.2023</a:t>
             </a:fld>
             <a:endParaRPr lang="de-DE"/>
           </a:p>
@@ -47651,7 +47678,7 @@
           <a:p>
             <a:fld id="{DD8B8171-21DA-4907-A9C5-6774B32408EF}" type="datetime1">
               <a:rPr lang="de-DE" smtClean="0"/>
-              <a:t>05.10.2022</a:t>
+              <a:t>01.03.2023</a:t>
             </a:fld>
             <a:endParaRPr lang="de-DE"/>
           </a:p>
@@ -48144,7 +48171,7 @@
           <a:p>
             <a:fld id="{1B9B7D4F-084D-4938-987D-2F1AC790542C}" type="datetime1">
               <a:rPr lang="de-DE" smtClean="0"/>
-              <a:t>05.10.2022</a:t>
+              <a:t>01.03.2023</a:t>
             </a:fld>
             <a:endParaRPr lang="de-DE"/>
           </a:p>
@@ -48525,7 +48552,7 @@
           <a:p>
             <a:fld id="{9B861850-1CC1-4EA2-B13E-5F4984DD6765}" type="datetime1">
               <a:rPr lang="de-DE" smtClean="0"/>
-              <a:t>05.10.2022</a:t>
+              <a:t>01.03.2023</a:t>
             </a:fld>
             <a:endParaRPr lang="de-DE"/>
           </a:p>
@@ -48751,7 +48778,7 @@
           <a:p>
             <a:fld id="{889CA5D6-219F-4100-8B22-6093808BA88C}" type="datetime1">
               <a:rPr lang="de-DE" smtClean="0"/>
-              <a:t>05.10.2022</a:t>
+              <a:t>01.03.2023</a:t>
             </a:fld>
             <a:endParaRPr lang="de-DE"/>
           </a:p>
@@ -48947,7 +48974,7 @@
           <a:p>
             <a:fld id="{E3EA1E44-3556-4DD6-B627-361E1D69BC25}" type="datetime1">
               <a:rPr lang="de-DE" smtClean="0"/>
-              <a:t>05.10.2022</a:t>
+              <a:t>01.03.2023</a:t>
             </a:fld>
             <a:endParaRPr lang="de-DE"/>
           </a:p>
@@ -49110,7 +49137,7 @@
           <a:p>
             <a:fld id="{1540C555-F8A4-4422-9B93-FA0C3929592C}" type="datetime1">
               <a:rPr lang="de-DE" smtClean="0"/>
-              <a:t>05.10.2022</a:t>
+              <a:t>01.03.2023</a:t>
             </a:fld>
             <a:endParaRPr lang="de-DE"/>
           </a:p>
@@ -49946,7 +49973,7 @@
           <a:p>
             <a:fld id="{5B67CC1C-91AE-4741-BE88-3E8933D29597}" type="datetime1">
               <a:rPr lang="de-DE" smtClean="0"/>
-              <a:t>05.10.2022</a:t>
+              <a:t>01.03.2023</a:t>
             </a:fld>
             <a:endParaRPr lang="de-DE"/>
           </a:p>
@@ -50579,7 +50606,7 @@
           <a:p>
             <a:fld id="{3466B08E-FC5F-4F44-9AE8-540AFED46B32}" type="datetime1">
               <a:rPr lang="de-DE" smtClean="0"/>
-              <a:t>05.10.2022</a:t>
+              <a:t>01.03.2023</a:t>
             </a:fld>
             <a:endParaRPr lang="de-DE"/>
           </a:p>

</xml_diff>